<commit_message>
Added a folder for Reviews with the necessary word document
</commit_message>
<xml_diff>
--- a/Seismic Drones/CASE-2016/pictures/auto_land.pptx
+++ b/Seismic Drones/CASE-2016/pictures/auto_land.pptx
@@ -243,7 +243,7 @@
           <a:p>
             <a:fld id="{997B1C16-7015-4D9D-A598-56E677A43B98}" type="datetimeFigureOut">
               <a:rPr lang="en-US" smtClean="0"/>
-              <a:t>3/15/2016</a:t>
+              <a:t>6/14/2016</a:t>
             </a:fld>
             <a:endParaRPr lang="en-US"/>
           </a:p>
@@ -413,7 +413,7 @@
           <a:p>
             <a:fld id="{997B1C16-7015-4D9D-A598-56E677A43B98}" type="datetimeFigureOut">
               <a:rPr lang="en-US" smtClean="0"/>
-              <a:t>3/15/2016</a:t>
+              <a:t>6/14/2016</a:t>
             </a:fld>
             <a:endParaRPr lang="en-US"/>
           </a:p>
@@ -593,7 +593,7 @@
           <a:p>
             <a:fld id="{997B1C16-7015-4D9D-A598-56E677A43B98}" type="datetimeFigureOut">
               <a:rPr lang="en-US" smtClean="0"/>
-              <a:t>3/15/2016</a:t>
+              <a:t>6/14/2016</a:t>
             </a:fld>
             <a:endParaRPr lang="en-US"/>
           </a:p>
@@ -763,7 +763,7 @@
           <a:p>
             <a:fld id="{997B1C16-7015-4D9D-A598-56E677A43B98}" type="datetimeFigureOut">
               <a:rPr lang="en-US" smtClean="0"/>
-              <a:t>3/15/2016</a:t>
+              <a:t>6/14/2016</a:t>
             </a:fld>
             <a:endParaRPr lang="en-US"/>
           </a:p>
@@ -1009,7 +1009,7 @@
           <a:p>
             <a:fld id="{997B1C16-7015-4D9D-A598-56E677A43B98}" type="datetimeFigureOut">
               <a:rPr lang="en-US" smtClean="0"/>
-              <a:t>3/15/2016</a:t>
+              <a:t>6/14/2016</a:t>
             </a:fld>
             <a:endParaRPr lang="en-US"/>
           </a:p>
@@ -1241,7 +1241,7 @@
           <a:p>
             <a:fld id="{997B1C16-7015-4D9D-A598-56E677A43B98}" type="datetimeFigureOut">
               <a:rPr lang="en-US" smtClean="0"/>
-              <a:t>3/15/2016</a:t>
+              <a:t>6/14/2016</a:t>
             </a:fld>
             <a:endParaRPr lang="en-US"/>
           </a:p>
@@ -1608,7 +1608,7 @@
           <a:p>
             <a:fld id="{997B1C16-7015-4D9D-A598-56E677A43B98}" type="datetimeFigureOut">
               <a:rPr lang="en-US" smtClean="0"/>
-              <a:t>3/15/2016</a:t>
+              <a:t>6/14/2016</a:t>
             </a:fld>
             <a:endParaRPr lang="en-US"/>
           </a:p>
@@ -1726,7 +1726,7 @@
           <a:p>
             <a:fld id="{997B1C16-7015-4D9D-A598-56E677A43B98}" type="datetimeFigureOut">
               <a:rPr lang="en-US" smtClean="0"/>
-              <a:t>3/15/2016</a:t>
+              <a:t>6/14/2016</a:t>
             </a:fld>
             <a:endParaRPr lang="en-US"/>
           </a:p>
@@ -1821,7 +1821,7 @@
           <a:p>
             <a:fld id="{997B1C16-7015-4D9D-A598-56E677A43B98}" type="datetimeFigureOut">
               <a:rPr lang="en-US" smtClean="0"/>
-              <a:t>3/15/2016</a:t>
+              <a:t>6/14/2016</a:t>
             </a:fld>
             <a:endParaRPr lang="en-US"/>
           </a:p>
@@ -2098,7 +2098,7 @@
           <a:p>
             <a:fld id="{997B1C16-7015-4D9D-A598-56E677A43B98}" type="datetimeFigureOut">
               <a:rPr lang="en-US" smtClean="0"/>
-              <a:t>3/15/2016</a:t>
+              <a:t>6/14/2016</a:t>
             </a:fld>
             <a:endParaRPr lang="en-US"/>
           </a:p>
@@ -2355,7 +2355,7 @@
           <a:p>
             <a:fld id="{997B1C16-7015-4D9D-A598-56E677A43B98}" type="datetimeFigureOut">
               <a:rPr lang="en-US" smtClean="0"/>
-              <a:t>3/15/2016</a:t>
+              <a:t>6/14/2016</a:t>
             </a:fld>
             <a:endParaRPr lang="en-US"/>
           </a:p>
@@ -2568,7 +2568,7 @@
           <a:p>
             <a:fld id="{997B1C16-7015-4D9D-A598-56E677A43B98}" type="datetimeFigureOut">
               <a:rPr lang="en-US" smtClean="0"/>
-              <a:t>3/15/2016</a:t>
+              <a:t>6/14/2016</a:t>
             </a:fld>
             <a:endParaRPr lang="en-US"/>
           </a:p>
@@ -2973,857 +2973,438 @@
           <a:chExt cx="0" cy="0"/>
         </a:xfrm>
       </p:grpSpPr>
-      <p:pic>
-        <p:nvPicPr>
-          <p:cNvPr id="22" name="Picture 4" descr="https://lh3.googleusercontent.com/TBLauE9INNblfq1G_KKYRwXm1oF8Wm_OfD8oNDKxCxgL1dcToQpy7YBTgWt-lNYsZ_FrTJlhge3wMA4v8fZRGq1-TcGVXnbqLo0L-OmM8EM6BLq7YI92xRYXnvn1_s8WZZqd9s_Nn7_QqZfp_5fxR-urRrsSsnZaH-gDk8ilXCRtvBO4kPnXKSN9S0IJ8YsFQXmSW-cS8LfFMsxgAcpiiCPmQaLewvd0RNpDleOFzHdDGhjRwOJ2AYRK0d0Gsg9e_XKi43u6UJ823pfkrC29mYoVKyKHS8Bwgys9Woh6KHA23murRh6YZl1gDUHNc-PFehrKIUFbNAymuV4Zx9gMhnXGO15ml_tJTM037RD9H842NiKEyfguusW-L45HXgwxTtEsoNw2aUoBeo_3g2_-eauMuItu8-6lEH6PWWfMnuNPyArqvVCym86fxJiiVoBLgyws5qtzl42T93JLncRBfKQdRUBAFTOEvJbfSck7P4QtNKguS2ItPtYDy-R9m91BIP6NS9_xJ9xqHbUoZd-W-8bWuATwGOiK90Rn2w_q_SvoDA5UyBpjo3-bTNYIQivSjiuk=w1191-h893-no"/>
-          <p:cNvPicPr>
-            <a:picLocks noChangeAspect="1" noChangeArrowheads="1"/>
-          </p:cNvPicPr>
-          <p:nvPr/>
-        </p:nvPicPr>
-        <p:blipFill rotWithShape="1">
-          <a:blip r:embed="rId2">
-            <a:extLst>
-              <a:ext uri="{28A0092B-C50C-407E-A947-70E740481C1C}">
-                <a14:useLocalDpi xmlns:a14="http://schemas.microsoft.com/office/drawing/2010/main" val="0"/>
-              </a:ext>
-            </a:extLst>
-          </a:blip>
-          <a:srcRect l="16528" t="3678" r="6450" b="2556"/>
-          <a:stretch/>
-        </p:blipFill>
-        <p:spPr bwMode="auto">
-          <a:xfrm flipH="1">
-            <a:off x="6985106" y="266357"/>
-            <a:ext cx="6487658" cy="5921862"/>
-          </a:xfrm>
-          <a:prstGeom prst="rect">
-            <a:avLst/>
-          </a:prstGeom>
-          <a:noFill/>
-          <a:extLst>
-            <a:ext uri="{909E8E84-426E-40DD-AFC4-6F175D3DCCD1}">
-              <a14:hiddenFill xmlns:a14="http://schemas.microsoft.com/office/drawing/2010/main">
-                <a:solidFill>
-                  <a:srgbClr val="FFFFFF"/>
-                </a:solidFill>
-              </a14:hiddenFill>
-            </a:ext>
-          </a:extLst>
-        </p:spPr>
-      </p:pic>
-      <p:sp>
-        <p:nvSpPr>
-          <p:cNvPr id="25" name="TextBox 24"/>
-          <p:cNvSpPr txBox="1"/>
-          <p:nvPr/>
-        </p:nvSpPr>
-        <p:spPr>
-          <a:xfrm>
-            <a:off x="6982515" y="215196"/>
-            <a:ext cx="426949" cy="430887"/>
-          </a:xfrm>
-          <a:prstGeom prst="rect">
-            <a:avLst/>
-          </a:prstGeom>
-          <a:noFill/>
-          <a:ln>
-            <a:noFill/>
-          </a:ln>
-        </p:spPr>
-        <p:txBody>
-          <a:bodyPr wrap="square" rtlCol="0">
-            <a:spAutoFit/>
-          </a:bodyPr>
-          <a:lstStyle/>
-          <a:p>
-            <a:r>
-              <a:rPr lang="en-US" sz="2200" dirty="0">
-                <a:solidFill>
-                  <a:schemeClr val="bg1"/>
-                </a:solidFill>
-              </a:rPr>
-              <a:t>b.</a:t>
-            </a:r>
-          </a:p>
-        </p:txBody>
-      </p:sp>
-      <p:sp>
-        <p:nvSpPr>
-          <p:cNvPr id="26" name="Oval 25"/>
-          <p:cNvSpPr/>
-          <p:nvPr/>
-        </p:nvSpPr>
-        <p:spPr>
-          <a:xfrm>
-            <a:off x="10658832" y="3028900"/>
-            <a:ext cx="366713" cy="387668"/>
-          </a:xfrm>
-          <a:prstGeom prst="ellipse">
-            <a:avLst/>
-          </a:prstGeom>
-          <a:noFill/>
-          <a:ln w="28575">
-            <a:solidFill>
-              <a:schemeClr val="bg1"/>
-            </a:solidFill>
-          </a:ln>
-        </p:spPr>
-        <p:style>
-          <a:lnRef idx="2">
-            <a:schemeClr val="accent1">
-              <a:shade val="50000"/>
-            </a:schemeClr>
-          </a:lnRef>
-          <a:fillRef idx="1">
-            <a:schemeClr val="accent1"/>
-          </a:fillRef>
-          <a:effectRef idx="0">
-            <a:schemeClr val="accent1"/>
-          </a:effectRef>
-          <a:fontRef idx="minor">
-            <a:schemeClr val="lt1"/>
-          </a:fontRef>
-        </p:style>
-        <p:txBody>
-          <a:bodyPr rtlCol="0" anchor="ctr"/>
-          <a:lstStyle/>
-          <a:p>
-            <a:pPr algn="ctr"/>
-            <a:endParaRPr lang="en-US" sz="981">
-              <a:solidFill>
-                <a:schemeClr val="bg1"/>
-              </a:solidFill>
-            </a:endParaRPr>
-          </a:p>
-        </p:txBody>
-      </p:sp>
-      <p:sp>
-        <p:nvSpPr>
-          <p:cNvPr id="29" name="Oval 28"/>
-          <p:cNvSpPr/>
-          <p:nvPr/>
-        </p:nvSpPr>
-        <p:spPr>
-          <a:xfrm>
-            <a:off x="7001768" y="5648625"/>
-            <a:ext cx="820996" cy="560427"/>
-          </a:xfrm>
-          <a:prstGeom prst="ellipse">
-            <a:avLst/>
-          </a:prstGeom>
-          <a:noFill/>
-          <a:ln w="28575">
-            <a:solidFill>
-              <a:schemeClr val="bg1"/>
-            </a:solidFill>
-          </a:ln>
-        </p:spPr>
-        <p:style>
-          <a:lnRef idx="2">
-            <a:schemeClr val="accent1">
-              <a:shade val="50000"/>
-            </a:schemeClr>
-          </a:lnRef>
-          <a:fillRef idx="1">
-            <a:schemeClr val="accent1"/>
-          </a:fillRef>
-          <a:effectRef idx="0">
-            <a:schemeClr val="accent1"/>
-          </a:effectRef>
-          <a:fontRef idx="minor">
-            <a:schemeClr val="lt1"/>
-          </a:fontRef>
-        </p:style>
-        <p:txBody>
-          <a:bodyPr rtlCol="0" anchor="ctr"/>
-          <a:lstStyle/>
-          <a:p>
-            <a:pPr algn="ctr"/>
-            <a:endParaRPr lang="en-US" sz="981"/>
-          </a:p>
-        </p:txBody>
-      </p:sp>
-      <p:sp>
-        <p:nvSpPr>
-          <p:cNvPr id="30" name="TextBox 29"/>
-          <p:cNvSpPr txBox="1"/>
-          <p:nvPr/>
-        </p:nvSpPr>
-        <p:spPr>
-          <a:xfrm>
-            <a:off x="6642002" y="3574095"/>
-            <a:ext cx="2750458" cy="1384995"/>
-          </a:xfrm>
-          <a:prstGeom prst="rect">
-            <a:avLst/>
-          </a:prstGeom>
-          <a:noFill/>
-          <a:ln>
-            <a:noFill/>
-          </a:ln>
-        </p:spPr>
-        <p:txBody>
-          <a:bodyPr wrap="square" rtlCol="0">
-            <a:spAutoFit/>
-          </a:bodyPr>
-          <a:lstStyle/>
-          <a:p>
-            <a:pPr algn="ctr"/>
-            <a:r>
-              <a:rPr lang="en-US" sz="2800" dirty="0" smtClean="0">
-                <a:solidFill>
-                  <a:schemeClr val="bg1"/>
-                </a:solidFill>
-              </a:rPr>
-              <a:t>Origin of the coordinate system (0,0)</a:t>
-            </a:r>
-            <a:endParaRPr lang="en-US" sz="2800" dirty="0">
-              <a:solidFill>
-                <a:schemeClr val="bg1"/>
-              </a:solidFill>
-            </a:endParaRPr>
-          </a:p>
-        </p:txBody>
-      </p:sp>
-      <p:cxnSp>
-        <p:nvCxnSpPr>
-          <p:cNvPr id="31" name="Straight Arrow Connector 30"/>
-          <p:cNvCxnSpPr/>
-          <p:nvPr/>
-        </p:nvCxnSpPr>
-        <p:spPr>
-          <a:xfrm flipH="1">
-            <a:off x="7572696" y="4935984"/>
-            <a:ext cx="171268" cy="659737"/>
-          </a:xfrm>
-          <a:prstGeom prst="straightConnector1">
-            <a:avLst/>
-          </a:prstGeom>
-          <a:ln w="28575">
-            <a:solidFill>
-              <a:schemeClr val="bg1"/>
-            </a:solidFill>
-            <a:tailEnd type="triangle"/>
-          </a:ln>
-        </p:spPr>
-        <p:style>
-          <a:lnRef idx="1">
-            <a:schemeClr val="accent1"/>
-          </a:lnRef>
-          <a:fillRef idx="0">
-            <a:schemeClr val="accent1"/>
-          </a:fillRef>
-          <a:effectRef idx="0">
-            <a:schemeClr val="accent1"/>
-          </a:effectRef>
-          <a:fontRef idx="minor">
-            <a:schemeClr val="tx1"/>
-          </a:fontRef>
-        </p:style>
-      </p:cxnSp>
-      <p:sp>
-        <p:nvSpPr>
-          <p:cNvPr id="32" name="TextBox 31"/>
-          <p:cNvSpPr txBox="1"/>
-          <p:nvPr/>
-        </p:nvSpPr>
-        <p:spPr>
-          <a:xfrm>
-            <a:off x="9979909" y="3689115"/>
-            <a:ext cx="1676400" cy="954107"/>
-          </a:xfrm>
-          <a:prstGeom prst="rect">
-            <a:avLst/>
-          </a:prstGeom>
-          <a:noFill/>
-          <a:ln>
-            <a:noFill/>
-          </a:ln>
-        </p:spPr>
-        <p:txBody>
-          <a:bodyPr wrap="square" rtlCol="0">
-            <a:spAutoFit/>
-          </a:bodyPr>
-          <a:lstStyle/>
-          <a:p>
-            <a:pPr algn="ctr"/>
-            <a:r>
-              <a:rPr lang="en-US" sz="2800" dirty="0">
-                <a:solidFill>
-                  <a:schemeClr val="bg1"/>
-                </a:solidFill>
-              </a:rPr>
-              <a:t>Goal </a:t>
-            </a:r>
-            <a:r>
-              <a:rPr lang="en-US" sz="2800" dirty="0" smtClean="0">
-                <a:solidFill>
-                  <a:schemeClr val="bg1"/>
-                </a:solidFill>
-              </a:rPr>
-              <a:t>location</a:t>
-            </a:r>
-            <a:endParaRPr lang="en-US" sz="2800" dirty="0">
-              <a:solidFill>
-                <a:schemeClr val="bg1"/>
-              </a:solidFill>
-            </a:endParaRPr>
-          </a:p>
-        </p:txBody>
-      </p:sp>
-      <p:cxnSp>
-        <p:nvCxnSpPr>
-          <p:cNvPr id="33" name="Straight Arrow Connector 32"/>
-          <p:cNvCxnSpPr/>
-          <p:nvPr/>
-        </p:nvCxnSpPr>
-        <p:spPr>
-          <a:xfrm flipV="1">
-            <a:off x="10818109" y="3427343"/>
-            <a:ext cx="0" cy="293505"/>
-          </a:xfrm>
-          <a:prstGeom prst="straightConnector1">
-            <a:avLst/>
-          </a:prstGeom>
-          <a:ln w="28575">
-            <a:solidFill>
-              <a:schemeClr val="bg1"/>
-            </a:solidFill>
-            <a:tailEnd type="triangle"/>
-          </a:ln>
-        </p:spPr>
-        <p:style>
-          <a:lnRef idx="1">
-            <a:schemeClr val="accent1"/>
-          </a:lnRef>
-          <a:fillRef idx="0">
-            <a:schemeClr val="accent1"/>
-          </a:fillRef>
-          <a:effectRef idx="0">
-            <a:schemeClr val="accent1"/>
-          </a:effectRef>
-          <a:fontRef idx="minor">
-            <a:schemeClr val="tx1"/>
-          </a:fontRef>
-        </p:style>
-      </p:cxnSp>
-      <p:sp>
-        <p:nvSpPr>
-          <p:cNvPr id="34" name="TextBox 33"/>
-          <p:cNvSpPr txBox="1"/>
-          <p:nvPr/>
-        </p:nvSpPr>
-        <p:spPr>
-          <a:xfrm>
-            <a:off x="7131762" y="1120175"/>
-            <a:ext cx="1676400" cy="954107"/>
-          </a:xfrm>
-          <a:prstGeom prst="rect">
-            <a:avLst/>
-          </a:prstGeom>
-          <a:noFill/>
-          <a:ln>
-            <a:noFill/>
-          </a:ln>
-        </p:spPr>
-        <p:txBody>
-          <a:bodyPr wrap="square" rtlCol="0">
-            <a:spAutoFit/>
-          </a:bodyPr>
-          <a:lstStyle/>
-          <a:p>
-            <a:pPr algn="ctr"/>
-            <a:r>
-              <a:rPr lang="en-US" sz="2800" dirty="0">
-                <a:solidFill>
-                  <a:schemeClr val="bg1"/>
-                </a:solidFill>
-              </a:rPr>
-              <a:t>Landing Location </a:t>
-            </a:r>
-          </a:p>
-        </p:txBody>
-      </p:sp>
-      <p:cxnSp>
-        <p:nvCxnSpPr>
-          <p:cNvPr id="35" name="Straight Arrow Connector 34"/>
-          <p:cNvCxnSpPr/>
-          <p:nvPr/>
-        </p:nvCxnSpPr>
-        <p:spPr>
-          <a:xfrm>
-            <a:off x="8612437" y="1604569"/>
-            <a:ext cx="1205745" cy="58734"/>
-          </a:xfrm>
-          <a:prstGeom prst="straightConnector1">
-            <a:avLst/>
-          </a:prstGeom>
-          <a:ln w="28575">
-            <a:solidFill>
-              <a:schemeClr val="bg1"/>
-            </a:solidFill>
-            <a:tailEnd type="triangle"/>
-          </a:ln>
-        </p:spPr>
-        <p:style>
-          <a:lnRef idx="1">
-            <a:schemeClr val="accent1"/>
-          </a:lnRef>
-          <a:fillRef idx="0">
-            <a:schemeClr val="accent1"/>
-          </a:fillRef>
-          <a:effectRef idx="0">
-            <a:schemeClr val="accent1"/>
-          </a:effectRef>
-          <a:fontRef idx="minor">
-            <a:schemeClr val="tx1"/>
-          </a:fontRef>
-        </p:style>
-      </p:cxnSp>
-      <p:sp>
-        <p:nvSpPr>
-          <p:cNvPr id="36" name="TextBox 35"/>
-          <p:cNvSpPr txBox="1"/>
-          <p:nvPr/>
-        </p:nvSpPr>
-        <p:spPr>
-          <a:xfrm>
-            <a:off x="7001768" y="-102020"/>
-            <a:ext cx="6451743" cy="461665"/>
-          </a:xfrm>
-          <a:prstGeom prst="rect">
-            <a:avLst/>
-          </a:prstGeom>
-          <a:noFill/>
-        </p:spPr>
-        <p:txBody>
-          <a:bodyPr wrap="square" rtlCol="0">
-            <a:spAutoFit/>
-          </a:bodyPr>
-          <a:lstStyle/>
-          <a:p>
-            <a:pPr algn="ctr"/>
-            <a:r>
-              <a:rPr lang="en-US" sz="2400" dirty="0"/>
-              <a:t>Autonomous Landing with Sensor Platform</a:t>
-            </a:r>
-          </a:p>
-        </p:txBody>
-      </p:sp>
       <p:grpSp>
         <p:nvGrpSpPr>
-          <p:cNvPr id="20" name="Group 19"/>
+          <p:cNvPr id="2" name="Group 1"/>
           <p:cNvGrpSpPr/>
           <p:nvPr/>
         </p:nvGrpSpPr>
         <p:grpSpPr>
           <a:xfrm>
             <a:off x="245224" y="-119859"/>
-            <a:ext cx="6556584" cy="6364475"/>
-            <a:chOff x="4020359" y="-90726"/>
-            <a:chExt cx="6556584" cy="6364475"/>
+            <a:ext cx="13227540" cy="6364475"/>
+            <a:chOff x="245224" y="-119859"/>
+            <a:chExt cx="13227540" cy="6364475"/>
           </a:xfrm>
         </p:grpSpPr>
-        <p:grpSp>
-          <p:nvGrpSpPr>
-            <p:cNvPr id="3" name="Group 2"/>
-            <p:cNvGrpSpPr/>
+        <p:pic>
+          <p:nvPicPr>
+            <p:cNvPr id="22" name="Picture 4" descr="https://lh3.googleusercontent.com/TBLauE9INNblfq1G_KKYRwXm1oF8Wm_OfD8oNDKxCxgL1dcToQpy7YBTgWt-lNYsZ_FrTJlhge3wMA4v8fZRGq1-TcGVXnbqLo0L-OmM8EM6BLq7YI92xRYXnvn1_s8WZZqd9s_Nn7_QqZfp_5fxR-urRrsSsnZaH-gDk8ilXCRtvBO4kPnXKSN9S0IJ8YsFQXmSW-cS8LfFMsxgAcpiiCPmQaLewvd0RNpDleOFzHdDGhjRwOJ2AYRK0d0Gsg9e_XKi43u6UJ823pfkrC29mYoVKyKHS8Bwgys9Woh6KHA23murRh6YZl1gDUHNc-PFehrKIUFbNAymuV4Zx9gMhnXGO15ml_tJTM037RD9H842NiKEyfguusW-L45HXgwxTtEsoNw2aUoBeo_3g2_-eauMuItu8-6lEH6PWWfMnuNPyArqvVCym86fxJiiVoBLgyws5qtzl42T93JLncRBfKQdRUBAFTOEvJbfSck7P4QtNKguS2ItPtYDy-R9m91BIP6NS9_xJ9xqHbUoZd-W-8bWuATwGOiK90Rn2w_q_SvoDA5UyBpjo3-bTNYIQivSjiuk=w1191-h893-no"/>
+            <p:cNvPicPr>
+              <a:picLocks noChangeAspect="1" noChangeArrowheads="1"/>
+            </p:cNvPicPr>
             <p:nvPr/>
-          </p:nvGrpSpPr>
-          <p:grpSpPr>
-            <a:xfrm>
-              <a:off x="4020359" y="212488"/>
-              <a:ext cx="6556584" cy="6061261"/>
-              <a:chOff x="252687" y="91227"/>
-              <a:chExt cx="9536849" cy="8816380"/>
-            </a:xfrm>
-          </p:grpSpPr>
-          <p:pic>
-            <p:nvPicPr>
-              <p:cNvPr id="1026" name="Picture 2" descr="https://lh3.googleusercontent.com/wHmu0wrVMOOfe2VjZG5_XsIwTozcz7ku-vygg8Q4sEw940IV73A41Wvcvk7s9GPhaXRU5RdfJowz9z5PFzmBvuMeLQcXZM41hxhx9YOYW_D1cPNxx6Pv1n5N-b-dTU-jnjIstXtVt69FYcJbupziZXCJ0QR_rdKDIvC1nlAwWfOU_a52ZoFuBxneVs4t2vKxRNezF43euAYz62PVZeR4H3Tn9_TiCMb_6zOL3f4IgsG1BDMhIfGk06DJ2ynpCVCcBH5g_FXo4NKVx9ZSGtem5JByubxpM-vuy0anaEH3cR7FScYFIyuchGQF3oJut9CA4OqSas4VhAPcXLYb3U03Apy4-i2AO3yjG22AQdCG5SJUuEPU78uRJuKSVHGRt2iTycsnqc_PN7Ur1XZRktSX8UIyjH7h4ouvXKZzTC97znlvri-V0DRUTK1aTvyoxl30UTXj4DEI7UCS5pEUVuj0ILvY7T2aybw_8KjWytjIi_GpQQcTtTQVCs8wYcdy3Z2SyJSCIuCJR4hW4la_xd0W_2FzU22g6UZrJfXEnFe9Kdk07MUzI_48xjvZrPFa8U6u0rg0=w1191-h893-no"/>
-              <p:cNvPicPr>
-                <a:picLocks noChangeAspect="1" noChangeArrowheads="1"/>
-              </p:cNvPicPr>
-              <p:nvPr/>
-            </p:nvPicPr>
-            <p:blipFill rotWithShape="1">
-              <a:blip r:embed="rId3">
-                <a:extLst>
-                  <a:ext uri="{28A0092B-C50C-407E-A947-70E740481C1C}">
-                    <a14:useLocalDpi xmlns:a14="http://schemas.microsoft.com/office/drawing/2010/main" val="0"/>
-                  </a:ext>
-                </a:extLst>
-              </a:blip>
-              <a:srcRect l="18332" t="2826" r="10209" b="10274"/>
-              <a:stretch/>
-            </p:blipFill>
-            <p:spPr bwMode="auto">
-              <a:xfrm>
-                <a:off x="280691" y="194702"/>
-                <a:ext cx="9484610" cy="8648129"/>
-              </a:xfrm>
-              <a:prstGeom prst="rect">
-                <a:avLst/>
-              </a:prstGeom>
-              <a:noFill/>
+          </p:nvPicPr>
+          <p:blipFill rotWithShape="1">
+            <a:blip r:embed="rId2">
               <a:extLst>
-                <a:ext uri="{909E8E84-426E-40DD-AFC4-6F175D3DCCD1}">
-                  <a14:hiddenFill xmlns:a14="http://schemas.microsoft.com/office/drawing/2010/main">
-                    <a:solidFill>
-                      <a:srgbClr val="FFFFFF"/>
-                    </a:solidFill>
-                  </a14:hiddenFill>
+                <a:ext uri="{28A0092B-C50C-407E-A947-70E740481C1C}">
+                  <a14:useLocalDpi xmlns:a14="http://schemas.microsoft.com/office/drawing/2010/main" val="0"/>
                 </a:ext>
               </a:extLst>
-            </p:spPr>
-          </p:pic>
-          <p:sp>
-            <p:nvSpPr>
-              <p:cNvPr id="15" name="TextBox 14"/>
-              <p:cNvSpPr txBox="1"/>
-              <p:nvPr/>
-            </p:nvSpPr>
-            <p:spPr>
-              <a:xfrm>
-                <a:off x="252687" y="91227"/>
-                <a:ext cx="647375" cy="626745"/>
-              </a:xfrm>
-              <a:prstGeom prst="rect">
-                <a:avLst/>
-              </a:prstGeom>
-              <a:noFill/>
-            </p:spPr>
-            <p:txBody>
-              <a:bodyPr wrap="square" rtlCol="0">
-                <a:spAutoFit/>
-              </a:bodyPr>
-              <a:lstStyle/>
-              <a:p>
-                <a:r>
-                  <a:rPr lang="en-US" sz="2200" dirty="0">
-                    <a:solidFill>
-                      <a:schemeClr val="bg1"/>
-                    </a:solidFill>
-                  </a:rPr>
-                  <a:t>a.</a:t>
-                </a:r>
-              </a:p>
-            </p:txBody>
-          </p:sp>
-          <p:sp>
-            <p:nvSpPr>
-              <p:cNvPr id="16" name="Oval 15"/>
-              <p:cNvSpPr/>
-              <p:nvPr/>
-            </p:nvSpPr>
-            <p:spPr>
-              <a:xfrm>
-                <a:off x="1737360" y="3703320"/>
-                <a:ext cx="533400" cy="563880"/>
-              </a:xfrm>
-              <a:prstGeom prst="ellipse">
-                <a:avLst/>
-              </a:prstGeom>
-              <a:noFill/>
-              <a:ln w="28575">
-                <a:solidFill>
-                  <a:schemeClr val="bg1"/>
-                </a:solidFill>
-              </a:ln>
-            </p:spPr>
-            <p:style>
-              <a:lnRef idx="2">
-                <a:schemeClr val="accent1">
-                  <a:shade val="50000"/>
-                </a:schemeClr>
-              </a:lnRef>
-              <a:fillRef idx="1">
-                <a:schemeClr val="accent1"/>
-              </a:fillRef>
-              <a:effectRef idx="0">
-                <a:schemeClr val="accent1"/>
-              </a:effectRef>
-              <a:fontRef idx="minor">
-                <a:schemeClr val="lt1"/>
-              </a:fontRef>
-            </p:style>
-            <p:txBody>
-              <a:bodyPr rtlCol="0" anchor="ctr"/>
-              <a:lstStyle/>
-              <a:p>
-                <a:pPr algn="ctr"/>
-                <a:endParaRPr lang="en-US" sz="981"/>
-              </a:p>
-            </p:txBody>
-          </p:sp>
-          <p:sp>
-            <p:nvSpPr>
-              <p:cNvPr id="19" name="Oval 18"/>
-              <p:cNvSpPr/>
-              <p:nvPr/>
-            </p:nvSpPr>
-            <p:spPr>
-              <a:xfrm>
-                <a:off x="8595360" y="8092440"/>
-                <a:ext cx="1194176" cy="815167"/>
-              </a:xfrm>
-              <a:prstGeom prst="ellipse">
-                <a:avLst/>
-              </a:prstGeom>
-              <a:noFill/>
-              <a:ln w="28575">
-                <a:solidFill>
-                  <a:schemeClr val="bg1"/>
-                </a:solidFill>
-              </a:ln>
-            </p:spPr>
-            <p:style>
-              <a:lnRef idx="2">
-                <a:schemeClr val="accent1">
-                  <a:shade val="50000"/>
-                </a:schemeClr>
-              </a:lnRef>
-              <a:fillRef idx="1">
-                <a:schemeClr val="accent1"/>
-              </a:fillRef>
-              <a:effectRef idx="0">
-                <a:schemeClr val="accent1"/>
-              </a:effectRef>
-              <a:fontRef idx="minor">
-                <a:schemeClr val="lt1"/>
-              </a:fontRef>
-            </p:style>
-            <p:txBody>
-              <a:bodyPr rtlCol="0" anchor="ctr"/>
-              <a:lstStyle/>
-              <a:p>
-                <a:pPr algn="ctr"/>
-                <a:endParaRPr lang="en-US" sz="981"/>
-              </a:p>
-            </p:txBody>
-          </p:sp>
-          <p:sp>
-            <p:nvSpPr>
-              <p:cNvPr id="18" name="TextBox 17"/>
-              <p:cNvSpPr txBox="1"/>
-              <p:nvPr/>
-            </p:nvSpPr>
-            <p:spPr>
-              <a:xfrm>
-                <a:off x="4571420" y="5582552"/>
-                <a:ext cx="3766471" cy="2014538"/>
-              </a:xfrm>
-              <a:prstGeom prst="rect">
-                <a:avLst/>
-              </a:prstGeom>
-              <a:noFill/>
-            </p:spPr>
-            <p:txBody>
-              <a:bodyPr wrap="square" rtlCol="0">
-                <a:spAutoFit/>
-              </a:bodyPr>
-              <a:lstStyle/>
-              <a:p>
-                <a:pPr algn="ctr"/>
-                <a:r>
-                  <a:rPr lang="en-US" sz="2800" dirty="0">
-                    <a:solidFill>
-                      <a:schemeClr val="bg1"/>
-                    </a:solidFill>
-                  </a:rPr>
-                  <a:t>Origin of the coordinate system (0,0)</a:t>
-                </a:r>
-              </a:p>
-            </p:txBody>
-          </p:sp>
-          <p:cxnSp>
-            <p:nvCxnSpPr>
-              <p:cNvPr id="21" name="Straight Arrow Connector 20"/>
-              <p:cNvCxnSpPr/>
-              <p:nvPr/>
-            </p:nvCxnSpPr>
-            <p:spPr>
-              <a:xfrm>
-                <a:off x="6636570" y="7597091"/>
-                <a:ext cx="1958790" cy="735898"/>
-              </a:xfrm>
-              <a:prstGeom prst="straightConnector1">
-                <a:avLst/>
-              </a:prstGeom>
-              <a:ln w="28575">
-                <a:solidFill>
-                  <a:schemeClr val="bg1"/>
-                </a:solidFill>
-                <a:tailEnd type="triangle"/>
-              </a:ln>
-            </p:spPr>
-            <p:style>
-              <a:lnRef idx="1">
-                <a:schemeClr val="accent1"/>
-              </a:lnRef>
-              <a:fillRef idx="0">
-                <a:schemeClr val="accent1"/>
-              </a:fillRef>
-              <a:effectRef idx="0">
-                <a:schemeClr val="accent1"/>
-              </a:effectRef>
-              <a:fontRef idx="minor">
-                <a:schemeClr val="tx1"/>
-              </a:fontRef>
-            </p:style>
-          </p:cxnSp>
-          <p:sp>
-            <p:nvSpPr>
-              <p:cNvPr id="23" name="TextBox 22"/>
-              <p:cNvSpPr txBox="1"/>
-              <p:nvPr/>
-            </p:nvSpPr>
-            <p:spPr>
-              <a:xfrm>
-                <a:off x="763766" y="4732225"/>
-                <a:ext cx="2438400" cy="1387792"/>
-              </a:xfrm>
-              <a:prstGeom prst="rect">
-                <a:avLst/>
-              </a:prstGeom>
-              <a:noFill/>
-            </p:spPr>
-            <p:txBody>
-              <a:bodyPr wrap="square" rtlCol="0">
-                <a:spAutoFit/>
-              </a:bodyPr>
-              <a:lstStyle/>
-              <a:p>
-                <a:pPr algn="ctr"/>
-                <a:r>
-                  <a:rPr lang="en-US" sz="2800" dirty="0">
-                    <a:solidFill>
-                      <a:schemeClr val="bg1"/>
-                    </a:solidFill>
-                  </a:rPr>
-                  <a:t>Goal location </a:t>
-                </a:r>
-              </a:p>
-            </p:txBody>
-          </p:sp>
-          <p:cxnSp>
-            <p:nvCxnSpPr>
-              <p:cNvPr id="24" name="Straight Arrow Connector 23"/>
-              <p:cNvCxnSpPr/>
-              <p:nvPr/>
-            </p:nvCxnSpPr>
-            <p:spPr>
-              <a:xfrm flipV="1">
-                <a:off x="2004060" y="4305308"/>
-                <a:ext cx="0" cy="426916"/>
-              </a:xfrm>
-              <a:prstGeom prst="straightConnector1">
-                <a:avLst/>
-              </a:prstGeom>
-              <a:ln w="28575">
-                <a:solidFill>
-                  <a:schemeClr val="bg1"/>
-                </a:solidFill>
-                <a:tailEnd type="triangle"/>
-              </a:ln>
-            </p:spPr>
-            <p:style>
-              <a:lnRef idx="1">
-                <a:schemeClr val="accent1"/>
-              </a:lnRef>
-              <a:fillRef idx="0">
-                <a:schemeClr val="accent1"/>
-              </a:fillRef>
-              <a:effectRef idx="0">
-                <a:schemeClr val="accent1"/>
-              </a:effectRef>
-              <a:fontRef idx="minor">
-                <a:schemeClr val="tx1"/>
-              </a:fontRef>
-            </p:style>
-          </p:cxnSp>
-          <p:sp>
-            <p:nvSpPr>
-              <p:cNvPr id="27" name="TextBox 26"/>
-              <p:cNvSpPr txBox="1"/>
-              <p:nvPr/>
-            </p:nvSpPr>
-            <p:spPr>
-              <a:xfrm>
-                <a:off x="3613058" y="2147771"/>
-                <a:ext cx="2438400" cy="1387792"/>
-              </a:xfrm>
-              <a:prstGeom prst="rect">
-                <a:avLst/>
-              </a:prstGeom>
-              <a:noFill/>
-            </p:spPr>
-            <p:txBody>
-              <a:bodyPr wrap="square" rtlCol="0">
-                <a:spAutoFit/>
-              </a:bodyPr>
-              <a:lstStyle/>
-              <a:p>
-                <a:pPr algn="ctr"/>
-                <a:r>
-                  <a:rPr lang="en-US" sz="2800" dirty="0">
-                    <a:solidFill>
-                      <a:schemeClr val="bg1"/>
-                    </a:solidFill>
-                  </a:rPr>
-                  <a:t>Landing Location </a:t>
-                </a:r>
-              </a:p>
-            </p:txBody>
-          </p:sp>
-          <p:cxnSp>
-            <p:nvCxnSpPr>
-              <p:cNvPr id="28" name="Straight Arrow Connector 27"/>
-              <p:cNvCxnSpPr/>
-              <p:nvPr/>
-            </p:nvCxnSpPr>
-            <p:spPr>
-              <a:xfrm flipH="1">
-                <a:off x="2004060" y="2629723"/>
-                <a:ext cx="1882047" cy="113476"/>
-              </a:xfrm>
-              <a:prstGeom prst="straightConnector1">
-                <a:avLst/>
-              </a:prstGeom>
-              <a:ln w="28575">
-                <a:solidFill>
-                  <a:schemeClr val="bg1"/>
-                </a:solidFill>
-                <a:tailEnd type="triangle"/>
-              </a:ln>
-            </p:spPr>
-            <p:style>
-              <a:lnRef idx="1">
-                <a:schemeClr val="accent1"/>
-              </a:lnRef>
-              <a:fillRef idx="0">
-                <a:schemeClr val="accent1"/>
-              </a:fillRef>
-              <a:effectRef idx="0">
-                <a:schemeClr val="accent1"/>
-              </a:effectRef>
-              <a:fontRef idx="minor">
-                <a:schemeClr val="tx1"/>
-              </a:fontRef>
-            </p:style>
-          </p:cxnSp>
-        </p:grpSp>
+            </a:blip>
+            <a:srcRect l="16528" t="3678" r="6450" b="2556"/>
+            <a:stretch/>
+          </p:blipFill>
+          <p:spPr bwMode="auto">
+            <a:xfrm flipH="1">
+              <a:off x="6985106" y="266357"/>
+              <a:ext cx="6487658" cy="5921862"/>
+            </a:xfrm>
+            <a:prstGeom prst="rect">
+              <a:avLst/>
+            </a:prstGeom>
+            <a:noFill/>
+            <a:extLst>
+              <a:ext uri="{909E8E84-426E-40DD-AFC4-6F175D3DCCD1}">
+                <a14:hiddenFill xmlns:a14="http://schemas.microsoft.com/office/drawing/2010/main">
+                  <a:solidFill>
+                    <a:srgbClr val="FFFFFF"/>
+                  </a:solidFill>
+                </a14:hiddenFill>
+              </a:ext>
+            </a:extLst>
+          </p:spPr>
+        </p:pic>
         <p:sp>
           <p:nvSpPr>
-            <p:cNvPr id="37" name="TextBox 36"/>
+            <p:cNvPr id="25" name="TextBox 24"/>
             <p:cNvSpPr txBox="1"/>
             <p:nvPr/>
           </p:nvSpPr>
           <p:spPr>
             <a:xfrm>
-              <a:off x="4039612" y="-90726"/>
-              <a:ext cx="6537331" cy="461665"/>
+              <a:off x="6982515" y="215196"/>
+              <a:ext cx="426949" cy="430887"/>
+            </a:xfrm>
+            <a:prstGeom prst="rect">
+              <a:avLst/>
+            </a:prstGeom>
+            <a:noFill/>
+            <a:ln>
+              <a:noFill/>
+            </a:ln>
+          </p:spPr>
+          <p:txBody>
+            <a:bodyPr wrap="square" rtlCol="0">
+              <a:spAutoFit/>
+            </a:bodyPr>
+            <a:lstStyle/>
+            <a:p>
+              <a:r>
+                <a:rPr lang="en-US" sz="2200" dirty="0">
+                  <a:solidFill>
+                    <a:schemeClr val="bg1"/>
+                  </a:solidFill>
+                </a:rPr>
+                <a:t>b.</a:t>
+              </a:r>
+            </a:p>
+          </p:txBody>
+        </p:sp>
+        <p:sp>
+          <p:nvSpPr>
+            <p:cNvPr id="26" name="Oval 25"/>
+            <p:cNvSpPr/>
+            <p:nvPr/>
+          </p:nvSpPr>
+          <p:spPr>
+            <a:xfrm>
+              <a:off x="10658832" y="3028900"/>
+              <a:ext cx="366713" cy="387668"/>
+            </a:xfrm>
+            <a:prstGeom prst="ellipse">
+              <a:avLst/>
+            </a:prstGeom>
+            <a:noFill/>
+            <a:ln w="28575">
+              <a:solidFill>
+                <a:schemeClr val="bg1"/>
+              </a:solidFill>
+            </a:ln>
+          </p:spPr>
+          <p:style>
+            <a:lnRef idx="2">
+              <a:schemeClr val="accent1">
+                <a:shade val="50000"/>
+              </a:schemeClr>
+            </a:lnRef>
+            <a:fillRef idx="1">
+              <a:schemeClr val="accent1"/>
+            </a:fillRef>
+            <a:effectRef idx="0">
+              <a:schemeClr val="accent1"/>
+            </a:effectRef>
+            <a:fontRef idx="minor">
+              <a:schemeClr val="lt1"/>
+            </a:fontRef>
+          </p:style>
+          <p:txBody>
+            <a:bodyPr rtlCol="0" anchor="ctr"/>
+            <a:lstStyle/>
+            <a:p>
+              <a:pPr algn="ctr"/>
+              <a:endParaRPr lang="en-US" sz="981">
+                <a:solidFill>
+                  <a:schemeClr val="bg1"/>
+                </a:solidFill>
+              </a:endParaRPr>
+            </a:p>
+          </p:txBody>
+        </p:sp>
+        <p:sp>
+          <p:nvSpPr>
+            <p:cNvPr id="29" name="Oval 28"/>
+            <p:cNvSpPr/>
+            <p:nvPr/>
+          </p:nvSpPr>
+          <p:spPr>
+            <a:xfrm>
+              <a:off x="7001768" y="5648625"/>
+              <a:ext cx="820996" cy="560427"/>
+            </a:xfrm>
+            <a:prstGeom prst="ellipse">
+              <a:avLst/>
+            </a:prstGeom>
+            <a:noFill/>
+            <a:ln w="28575">
+              <a:solidFill>
+                <a:schemeClr val="bg1"/>
+              </a:solidFill>
+            </a:ln>
+          </p:spPr>
+          <p:style>
+            <a:lnRef idx="2">
+              <a:schemeClr val="accent1">
+                <a:shade val="50000"/>
+              </a:schemeClr>
+            </a:lnRef>
+            <a:fillRef idx="1">
+              <a:schemeClr val="accent1"/>
+            </a:fillRef>
+            <a:effectRef idx="0">
+              <a:schemeClr val="accent1"/>
+            </a:effectRef>
+            <a:fontRef idx="minor">
+              <a:schemeClr val="lt1"/>
+            </a:fontRef>
+          </p:style>
+          <p:txBody>
+            <a:bodyPr rtlCol="0" anchor="ctr"/>
+            <a:lstStyle/>
+            <a:p>
+              <a:pPr algn="ctr"/>
+              <a:endParaRPr lang="en-US" sz="981"/>
+            </a:p>
+          </p:txBody>
+        </p:sp>
+        <p:sp>
+          <p:nvSpPr>
+            <p:cNvPr id="30" name="TextBox 29"/>
+            <p:cNvSpPr txBox="1"/>
+            <p:nvPr/>
+          </p:nvSpPr>
+          <p:spPr>
+            <a:xfrm>
+              <a:off x="6642002" y="3574095"/>
+              <a:ext cx="2750458" cy="1384995"/>
+            </a:xfrm>
+            <a:prstGeom prst="rect">
+              <a:avLst/>
+            </a:prstGeom>
+            <a:noFill/>
+            <a:ln>
+              <a:noFill/>
+            </a:ln>
+          </p:spPr>
+          <p:txBody>
+            <a:bodyPr wrap="square" rtlCol="0">
+              <a:spAutoFit/>
+            </a:bodyPr>
+            <a:lstStyle/>
+            <a:p>
+              <a:pPr algn="ctr"/>
+              <a:r>
+                <a:rPr lang="en-US" sz="2800" dirty="0" smtClean="0">
+                  <a:solidFill>
+                    <a:schemeClr val="bg1"/>
+                  </a:solidFill>
+                </a:rPr>
+                <a:t>Origin of the coordinate system (0,0)</a:t>
+              </a:r>
+              <a:endParaRPr lang="en-US" sz="2800" dirty="0">
+                <a:solidFill>
+                  <a:schemeClr val="bg1"/>
+                </a:solidFill>
+              </a:endParaRPr>
+            </a:p>
+          </p:txBody>
+        </p:sp>
+        <p:cxnSp>
+          <p:nvCxnSpPr>
+            <p:cNvPr id="31" name="Straight Arrow Connector 30"/>
+            <p:cNvCxnSpPr/>
+            <p:nvPr/>
+          </p:nvCxnSpPr>
+          <p:spPr>
+            <a:xfrm flipH="1">
+              <a:off x="7572696" y="4935984"/>
+              <a:ext cx="171268" cy="659737"/>
+            </a:xfrm>
+            <a:prstGeom prst="straightConnector1">
+              <a:avLst/>
+            </a:prstGeom>
+            <a:ln w="28575">
+              <a:solidFill>
+                <a:schemeClr val="bg1"/>
+              </a:solidFill>
+              <a:tailEnd type="triangle"/>
+            </a:ln>
+          </p:spPr>
+          <p:style>
+            <a:lnRef idx="1">
+              <a:schemeClr val="accent1"/>
+            </a:lnRef>
+            <a:fillRef idx="0">
+              <a:schemeClr val="accent1"/>
+            </a:fillRef>
+            <a:effectRef idx="0">
+              <a:schemeClr val="accent1"/>
+            </a:effectRef>
+            <a:fontRef idx="minor">
+              <a:schemeClr val="tx1"/>
+            </a:fontRef>
+          </p:style>
+        </p:cxnSp>
+        <p:sp>
+          <p:nvSpPr>
+            <p:cNvPr id="32" name="TextBox 31"/>
+            <p:cNvSpPr txBox="1"/>
+            <p:nvPr/>
+          </p:nvSpPr>
+          <p:spPr>
+            <a:xfrm>
+              <a:off x="9979909" y="3689115"/>
+              <a:ext cx="1676400" cy="954107"/>
+            </a:xfrm>
+            <a:prstGeom prst="rect">
+              <a:avLst/>
+            </a:prstGeom>
+            <a:noFill/>
+            <a:ln>
+              <a:noFill/>
+            </a:ln>
+          </p:spPr>
+          <p:txBody>
+            <a:bodyPr wrap="square" rtlCol="0">
+              <a:spAutoFit/>
+            </a:bodyPr>
+            <a:lstStyle/>
+            <a:p>
+              <a:pPr algn="ctr"/>
+              <a:r>
+                <a:rPr lang="en-US" sz="2800" dirty="0">
+                  <a:solidFill>
+                    <a:schemeClr val="bg1"/>
+                  </a:solidFill>
+                </a:rPr>
+                <a:t>Goal </a:t>
+              </a:r>
+              <a:r>
+                <a:rPr lang="en-US" sz="2800" dirty="0" smtClean="0">
+                  <a:solidFill>
+                    <a:schemeClr val="bg1"/>
+                  </a:solidFill>
+                </a:rPr>
+                <a:t>location</a:t>
+              </a:r>
+              <a:endParaRPr lang="en-US" sz="2800" dirty="0">
+                <a:solidFill>
+                  <a:schemeClr val="bg1"/>
+                </a:solidFill>
+              </a:endParaRPr>
+            </a:p>
+          </p:txBody>
+        </p:sp>
+        <p:cxnSp>
+          <p:nvCxnSpPr>
+            <p:cNvPr id="33" name="Straight Arrow Connector 32"/>
+            <p:cNvCxnSpPr/>
+            <p:nvPr/>
+          </p:nvCxnSpPr>
+          <p:spPr>
+            <a:xfrm flipV="1">
+              <a:off x="10818109" y="3427343"/>
+              <a:ext cx="0" cy="293505"/>
+            </a:xfrm>
+            <a:prstGeom prst="straightConnector1">
+              <a:avLst/>
+            </a:prstGeom>
+            <a:ln w="28575">
+              <a:solidFill>
+                <a:schemeClr val="bg1"/>
+              </a:solidFill>
+              <a:tailEnd type="triangle"/>
+            </a:ln>
+          </p:spPr>
+          <p:style>
+            <a:lnRef idx="1">
+              <a:schemeClr val="accent1"/>
+            </a:lnRef>
+            <a:fillRef idx="0">
+              <a:schemeClr val="accent1"/>
+            </a:fillRef>
+            <a:effectRef idx="0">
+              <a:schemeClr val="accent1"/>
+            </a:effectRef>
+            <a:fontRef idx="minor">
+              <a:schemeClr val="tx1"/>
+            </a:fontRef>
+          </p:style>
+        </p:cxnSp>
+        <p:sp>
+          <p:nvSpPr>
+            <p:cNvPr id="34" name="TextBox 33"/>
+            <p:cNvSpPr txBox="1"/>
+            <p:nvPr/>
+          </p:nvSpPr>
+          <p:spPr>
+            <a:xfrm>
+              <a:off x="7131762" y="1120175"/>
+              <a:ext cx="1676400" cy="954107"/>
+            </a:xfrm>
+            <a:prstGeom prst="rect">
+              <a:avLst/>
+            </a:prstGeom>
+            <a:noFill/>
+            <a:ln>
+              <a:noFill/>
+            </a:ln>
+          </p:spPr>
+          <p:txBody>
+            <a:bodyPr wrap="square" rtlCol="0">
+              <a:spAutoFit/>
+            </a:bodyPr>
+            <a:lstStyle/>
+            <a:p>
+              <a:pPr algn="ctr"/>
+              <a:r>
+                <a:rPr lang="en-US" sz="2800" dirty="0">
+                  <a:solidFill>
+                    <a:schemeClr val="bg1"/>
+                  </a:solidFill>
+                </a:rPr>
+                <a:t>Landing Location </a:t>
+              </a:r>
+            </a:p>
+          </p:txBody>
+        </p:sp>
+        <p:cxnSp>
+          <p:nvCxnSpPr>
+            <p:cNvPr id="35" name="Straight Arrow Connector 34"/>
+            <p:cNvCxnSpPr/>
+            <p:nvPr/>
+          </p:nvCxnSpPr>
+          <p:spPr>
+            <a:xfrm>
+              <a:off x="8612437" y="1604569"/>
+              <a:ext cx="1205745" cy="58734"/>
+            </a:xfrm>
+            <a:prstGeom prst="straightConnector1">
+              <a:avLst/>
+            </a:prstGeom>
+            <a:ln w="28575">
+              <a:solidFill>
+                <a:schemeClr val="bg1"/>
+              </a:solidFill>
+              <a:tailEnd type="triangle"/>
+            </a:ln>
+          </p:spPr>
+          <p:style>
+            <a:lnRef idx="1">
+              <a:schemeClr val="accent1"/>
+            </a:lnRef>
+            <a:fillRef idx="0">
+              <a:schemeClr val="accent1"/>
+            </a:fillRef>
+            <a:effectRef idx="0">
+              <a:schemeClr val="accent1"/>
+            </a:effectRef>
+            <a:fontRef idx="minor">
+              <a:schemeClr val="tx1"/>
+            </a:fontRef>
+          </p:style>
+        </p:cxnSp>
+        <p:sp>
+          <p:nvSpPr>
+            <p:cNvPr id="36" name="TextBox 35"/>
+            <p:cNvSpPr txBox="1"/>
+            <p:nvPr/>
+          </p:nvSpPr>
+          <p:spPr>
+            <a:xfrm>
+              <a:off x="7001768" y="-102020"/>
+              <a:ext cx="6451743" cy="461665"/>
             </a:xfrm>
             <a:prstGeom prst="rect">
               <a:avLst/>
@@ -3839,11 +3420,445 @@
               <a:pPr algn="ctr"/>
               <a:r>
                 <a:rPr lang="en-US" sz="2400" dirty="0"/>
-                <a:t>Autonomous Landing without Sensor Platform</a:t>
+                <a:t>Autonomous Landing with Sensor Platform</a:t>
               </a:r>
             </a:p>
           </p:txBody>
         </p:sp>
+        <p:grpSp>
+          <p:nvGrpSpPr>
+            <p:cNvPr id="20" name="Group 19"/>
+            <p:cNvGrpSpPr/>
+            <p:nvPr/>
+          </p:nvGrpSpPr>
+          <p:grpSpPr>
+            <a:xfrm>
+              <a:off x="245224" y="-119859"/>
+              <a:ext cx="6556584" cy="6364475"/>
+              <a:chOff x="4020359" y="-90726"/>
+              <a:chExt cx="6556584" cy="6364475"/>
+            </a:xfrm>
+          </p:grpSpPr>
+          <p:grpSp>
+            <p:nvGrpSpPr>
+              <p:cNvPr id="3" name="Group 2"/>
+              <p:cNvGrpSpPr/>
+              <p:nvPr/>
+            </p:nvGrpSpPr>
+            <p:grpSpPr>
+              <a:xfrm>
+                <a:off x="4020359" y="212488"/>
+                <a:ext cx="6556584" cy="6061261"/>
+                <a:chOff x="252687" y="91227"/>
+                <a:chExt cx="9536849" cy="8816380"/>
+              </a:xfrm>
+            </p:grpSpPr>
+            <p:pic>
+              <p:nvPicPr>
+                <p:cNvPr id="1026" name="Picture 2" descr="https://lh3.googleusercontent.com/wHmu0wrVMOOfe2VjZG5_XsIwTozcz7ku-vygg8Q4sEw940IV73A41Wvcvk7s9GPhaXRU5RdfJowz9z5PFzmBvuMeLQcXZM41hxhx9YOYW_D1cPNxx6Pv1n5N-b-dTU-jnjIstXtVt69FYcJbupziZXCJ0QR_rdKDIvC1nlAwWfOU_a52ZoFuBxneVs4t2vKxRNezF43euAYz62PVZeR4H3Tn9_TiCMb_6zOL3f4IgsG1BDMhIfGk06DJ2ynpCVCcBH5g_FXo4NKVx9ZSGtem5JByubxpM-vuy0anaEH3cR7FScYFIyuchGQF3oJut9CA4OqSas4VhAPcXLYb3U03Apy4-i2AO3yjG22AQdCG5SJUuEPU78uRJuKSVHGRt2iTycsnqc_PN7Ur1XZRktSX8UIyjH7h4ouvXKZzTC97znlvri-V0DRUTK1aTvyoxl30UTXj4DEI7UCS5pEUVuj0ILvY7T2aybw_8KjWytjIi_GpQQcTtTQVCs8wYcdy3Z2SyJSCIuCJR4hW4la_xd0W_2FzU22g6UZrJfXEnFe9Kdk07MUzI_48xjvZrPFa8U6u0rg0=w1191-h893-no"/>
+                <p:cNvPicPr>
+                  <a:picLocks noChangeAspect="1" noChangeArrowheads="1"/>
+                </p:cNvPicPr>
+                <p:nvPr/>
+              </p:nvPicPr>
+              <p:blipFill rotWithShape="1">
+                <a:blip r:embed="rId3">
+                  <a:extLst>
+                    <a:ext uri="{28A0092B-C50C-407E-A947-70E740481C1C}">
+                      <a14:useLocalDpi xmlns:a14="http://schemas.microsoft.com/office/drawing/2010/main" val="0"/>
+                    </a:ext>
+                  </a:extLst>
+                </a:blip>
+                <a:srcRect l="18332" t="2826" r="10209" b="10274"/>
+                <a:stretch/>
+              </p:blipFill>
+              <p:spPr bwMode="auto">
+                <a:xfrm>
+                  <a:off x="280691" y="194702"/>
+                  <a:ext cx="9484610" cy="8648129"/>
+                </a:xfrm>
+                <a:prstGeom prst="rect">
+                  <a:avLst/>
+                </a:prstGeom>
+                <a:noFill/>
+                <a:extLst>
+                  <a:ext uri="{909E8E84-426E-40DD-AFC4-6F175D3DCCD1}">
+                    <a14:hiddenFill xmlns:a14="http://schemas.microsoft.com/office/drawing/2010/main">
+                      <a:solidFill>
+                        <a:srgbClr val="FFFFFF"/>
+                      </a:solidFill>
+                    </a14:hiddenFill>
+                  </a:ext>
+                </a:extLst>
+              </p:spPr>
+            </p:pic>
+            <p:sp>
+              <p:nvSpPr>
+                <p:cNvPr id="15" name="TextBox 14"/>
+                <p:cNvSpPr txBox="1"/>
+                <p:nvPr/>
+              </p:nvSpPr>
+              <p:spPr>
+                <a:xfrm>
+                  <a:off x="252687" y="91227"/>
+                  <a:ext cx="647375" cy="626745"/>
+                </a:xfrm>
+                <a:prstGeom prst="rect">
+                  <a:avLst/>
+                </a:prstGeom>
+                <a:noFill/>
+              </p:spPr>
+              <p:txBody>
+                <a:bodyPr wrap="square" rtlCol="0">
+                  <a:spAutoFit/>
+                </a:bodyPr>
+                <a:lstStyle/>
+                <a:p>
+                  <a:r>
+                    <a:rPr lang="en-US" sz="2200" dirty="0">
+                      <a:solidFill>
+                        <a:schemeClr val="bg1"/>
+                      </a:solidFill>
+                    </a:rPr>
+                    <a:t>a.</a:t>
+                  </a:r>
+                </a:p>
+              </p:txBody>
+            </p:sp>
+            <p:sp>
+              <p:nvSpPr>
+                <p:cNvPr id="16" name="Oval 15"/>
+                <p:cNvSpPr/>
+                <p:nvPr/>
+              </p:nvSpPr>
+              <p:spPr>
+                <a:xfrm>
+                  <a:off x="1737360" y="3703320"/>
+                  <a:ext cx="533400" cy="563880"/>
+                </a:xfrm>
+                <a:prstGeom prst="ellipse">
+                  <a:avLst/>
+                </a:prstGeom>
+                <a:noFill/>
+                <a:ln w="28575">
+                  <a:solidFill>
+                    <a:schemeClr val="bg1"/>
+                  </a:solidFill>
+                </a:ln>
+              </p:spPr>
+              <p:style>
+                <a:lnRef idx="2">
+                  <a:schemeClr val="accent1">
+                    <a:shade val="50000"/>
+                  </a:schemeClr>
+                </a:lnRef>
+                <a:fillRef idx="1">
+                  <a:schemeClr val="accent1"/>
+                </a:fillRef>
+                <a:effectRef idx="0">
+                  <a:schemeClr val="accent1"/>
+                </a:effectRef>
+                <a:fontRef idx="minor">
+                  <a:schemeClr val="lt1"/>
+                </a:fontRef>
+              </p:style>
+              <p:txBody>
+                <a:bodyPr rtlCol="0" anchor="ctr"/>
+                <a:lstStyle/>
+                <a:p>
+                  <a:pPr algn="ctr"/>
+                  <a:endParaRPr lang="en-US" sz="981"/>
+                </a:p>
+              </p:txBody>
+            </p:sp>
+            <p:sp>
+              <p:nvSpPr>
+                <p:cNvPr id="19" name="Oval 18"/>
+                <p:cNvSpPr/>
+                <p:nvPr/>
+              </p:nvSpPr>
+              <p:spPr>
+                <a:xfrm>
+                  <a:off x="8595360" y="8092440"/>
+                  <a:ext cx="1194176" cy="815167"/>
+                </a:xfrm>
+                <a:prstGeom prst="ellipse">
+                  <a:avLst/>
+                </a:prstGeom>
+                <a:noFill/>
+                <a:ln w="28575">
+                  <a:solidFill>
+                    <a:schemeClr val="bg1"/>
+                  </a:solidFill>
+                </a:ln>
+              </p:spPr>
+              <p:style>
+                <a:lnRef idx="2">
+                  <a:schemeClr val="accent1">
+                    <a:shade val="50000"/>
+                  </a:schemeClr>
+                </a:lnRef>
+                <a:fillRef idx="1">
+                  <a:schemeClr val="accent1"/>
+                </a:fillRef>
+                <a:effectRef idx="0">
+                  <a:schemeClr val="accent1"/>
+                </a:effectRef>
+                <a:fontRef idx="minor">
+                  <a:schemeClr val="lt1"/>
+                </a:fontRef>
+              </p:style>
+              <p:txBody>
+                <a:bodyPr rtlCol="0" anchor="ctr"/>
+                <a:lstStyle/>
+                <a:p>
+                  <a:pPr algn="ctr"/>
+                  <a:endParaRPr lang="en-US" sz="981"/>
+                </a:p>
+              </p:txBody>
+            </p:sp>
+            <p:sp>
+              <p:nvSpPr>
+                <p:cNvPr id="18" name="TextBox 17"/>
+                <p:cNvSpPr txBox="1"/>
+                <p:nvPr/>
+              </p:nvSpPr>
+              <p:spPr>
+                <a:xfrm>
+                  <a:off x="4571420" y="5582552"/>
+                  <a:ext cx="3766471" cy="2014538"/>
+                </a:xfrm>
+                <a:prstGeom prst="rect">
+                  <a:avLst/>
+                </a:prstGeom>
+                <a:noFill/>
+              </p:spPr>
+              <p:txBody>
+                <a:bodyPr wrap="square" rtlCol="0">
+                  <a:spAutoFit/>
+                </a:bodyPr>
+                <a:lstStyle/>
+                <a:p>
+                  <a:pPr algn="ctr"/>
+                  <a:r>
+                    <a:rPr lang="en-US" sz="2800" dirty="0">
+                      <a:solidFill>
+                        <a:schemeClr val="bg1"/>
+                      </a:solidFill>
+                    </a:rPr>
+                    <a:t>Origin of the coordinate system (0,0)</a:t>
+                  </a:r>
+                </a:p>
+              </p:txBody>
+            </p:sp>
+            <p:cxnSp>
+              <p:nvCxnSpPr>
+                <p:cNvPr id="21" name="Straight Arrow Connector 20"/>
+                <p:cNvCxnSpPr/>
+                <p:nvPr/>
+              </p:nvCxnSpPr>
+              <p:spPr>
+                <a:xfrm>
+                  <a:off x="6636570" y="7597091"/>
+                  <a:ext cx="1958790" cy="735898"/>
+                </a:xfrm>
+                <a:prstGeom prst="straightConnector1">
+                  <a:avLst/>
+                </a:prstGeom>
+                <a:ln w="28575">
+                  <a:solidFill>
+                    <a:schemeClr val="bg1"/>
+                  </a:solidFill>
+                  <a:tailEnd type="triangle"/>
+                </a:ln>
+              </p:spPr>
+              <p:style>
+                <a:lnRef idx="1">
+                  <a:schemeClr val="accent1"/>
+                </a:lnRef>
+                <a:fillRef idx="0">
+                  <a:schemeClr val="accent1"/>
+                </a:fillRef>
+                <a:effectRef idx="0">
+                  <a:schemeClr val="accent1"/>
+                </a:effectRef>
+                <a:fontRef idx="minor">
+                  <a:schemeClr val="tx1"/>
+                </a:fontRef>
+              </p:style>
+            </p:cxnSp>
+            <p:sp>
+              <p:nvSpPr>
+                <p:cNvPr id="23" name="TextBox 22"/>
+                <p:cNvSpPr txBox="1"/>
+                <p:nvPr/>
+              </p:nvSpPr>
+              <p:spPr>
+                <a:xfrm>
+                  <a:off x="763766" y="4732225"/>
+                  <a:ext cx="2438400" cy="1387792"/>
+                </a:xfrm>
+                <a:prstGeom prst="rect">
+                  <a:avLst/>
+                </a:prstGeom>
+                <a:noFill/>
+              </p:spPr>
+              <p:txBody>
+                <a:bodyPr wrap="square" rtlCol="0">
+                  <a:spAutoFit/>
+                </a:bodyPr>
+                <a:lstStyle/>
+                <a:p>
+                  <a:pPr algn="ctr"/>
+                  <a:r>
+                    <a:rPr lang="en-US" sz="2800" dirty="0">
+                      <a:solidFill>
+                        <a:schemeClr val="bg1"/>
+                      </a:solidFill>
+                    </a:rPr>
+                    <a:t>Goal location </a:t>
+                  </a:r>
+                </a:p>
+              </p:txBody>
+            </p:sp>
+            <p:cxnSp>
+              <p:nvCxnSpPr>
+                <p:cNvPr id="24" name="Straight Arrow Connector 23"/>
+                <p:cNvCxnSpPr/>
+                <p:nvPr/>
+              </p:nvCxnSpPr>
+              <p:spPr>
+                <a:xfrm flipV="1">
+                  <a:off x="2004060" y="4305308"/>
+                  <a:ext cx="0" cy="426916"/>
+                </a:xfrm>
+                <a:prstGeom prst="straightConnector1">
+                  <a:avLst/>
+                </a:prstGeom>
+                <a:ln w="28575">
+                  <a:solidFill>
+                    <a:schemeClr val="bg1"/>
+                  </a:solidFill>
+                  <a:tailEnd type="triangle"/>
+                </a:ln>
+              </p:spPr>
+              <p:style>
+                <a:lnRef idx="1">
+                  <a:schemeClr val="accent1"/>
+                </a:lnRef>
+                <a:fillRef idx="0">
+                  <a:schemeClr val="accent1"/>
+                </a:fillRef>
+                <a:effectRef idx="0">
+                  <a:schemeClr val="accent1"/>
+                </a:effectRef>
+                <a:fontRef idx="minor">
+                  <a:schemeClr val="tx1"/>
+                </a:fontRef>
+              </p:style>
+            </p:cxnSp>
+            <p:sp>
+              <p:nvSpPr>
+                <p:cNvPr id="27" name="TextBox 26"/>
+                <p:cNvSpPr txBox="1"/>
+                <p:nvPr/>
+              </p:nvSpPr>
+              <p:spPr>
+                <a:xfrm>
+                  <a:off x="3613058" y="2147771"/>
+                  <a:ext cx="2438400" cy="1387792"/>
+                </a:xfrm>
+                <a:prstGeom prst="rect">
+                  <a:avLst/>
+                </a:prstGeom>
+                <a:noFill/>
+              </p:spPr>
+              <p:txBody>
+                <a:bodyPr wrap="square" rtlCol="0">
+                  <a:spAutoFit/>
+                </a:bodyPr>
+                <a:lstStyle/>
+                <a:p>
+                  <a:pPr algn="ctr"/>
+                  <a:r>
+                    <a:rPr lang="en-US" sz="2800" dirty="0">
+                      <a:solidFill>
+                        <a:schemeClr val="bg1"/>
+                      </a:solidFill>
+                    </a:rPr>
+                    <a:t>Landing Location </a:t>
+                  </a:r>
+                </a:p>
+              </p:txBody>
+            </p:sp>
+            <p:cxnSp>
+              <p:nvCxnSpPr>
+                <p:cNvPr id="28" name="Straight Arrow Connector 27"/>
+                <p:cNvCxnSpPr/>
+                <p:nvPr/>
+              </p:nvCxnSpPr>
+              <p:spPr>
+                <a:xfrm flipH="1">
+                  <a:off x="2004060" y="2629723"/>
+                  <a:ext cx="1882047" cy="113476"/>
+                </a:xfrm>
+                <a:prstGeom prst="straightConnector1">
+                  <a:avLst/>
+                </a:prstGeom>
+                <a:ln w="28575">
+                  <a:solidFill>
+                    <a:schemeClr val="bg1"/>
+                  </a:solidFill>
+                  <a:tailEnd type="triangle"/>
+                </a:ln>
+              </p:spPr>
+              <p:style>
+                <a:lnRef idx="1">
+                  <a:schemeClr val="accent1"/>
+                </a:lnRef>
+                <a:fillRef idx="0">
+                  <a:schemeClr val="accent1"/>
+                </a:fillRef>
+                <a:effectRef idx="0">
+                  <a:schemeClr val="accent1"/>
+                </a:effectRef>
+                <a:fontRef idx="minor">
+                  <a:schemeClr val="tx1"/>
+                </a:fontRef>
+              </p:style>
+            </p:cxnSp>
+          </p:grpSp>
+          <p:sp>
+            <p:nvSpPr>
+              <p:cNvPr id="37" name="TextBox 36"/>
+              <p:cNvSpPr txBox="1"/>
+              <p:nvPr/>
+            </p:nvSpPr>
+            <p:spPr>
+              <a:xfrm>
+                <a:off x="4039612" y="-90726"/>
+                <a:ext cx="6537331" cy="461665"/>
+              </a:xfrm>
+              <a:prstGeom prst="rect">
+                <a:avLst/>
+              </a:prstGeom>
+              <a:noFill/>
+            </p:spPr>
+            <p:txBody>
+              <a:bodyPr wrap="square" rtlCol="0">
+                <a:spAutoFit/>
+              </a:bodyPr>
+              <a:lstStyle/>
+              <a:p>
+                <a:pPr algn="ctr"/>
+                <a:r>
+                  <a:rPr lang="en-US" sz="2400" dirty="0"/>
+                  <a:t>Autonomous Landing without Sensor Platform</a:t>
+                </a:r>
+              </a:p>
+            </p:txBody>
+          </p:sp>
+        </p:grpSp>
       </p:grpSp>
     </p:spTree>
     <p:extLst>

</xml_diff>